<commit_message>
update developerguide and add more diagrams
</commit_message>
<xml_diff>
--- a/docs/diagrams/AddSampleTextFileSequenceDiagram.pptx
+++ b/docs/diagrams/AddSampleTextFileSequenceDiagram.pptx
@@ -208,7 +208,7 @@
           <a:p>
             <a:fld id="{F5CC4B3F-88C1-4FFA-B1B6-F41C21DC6924}" type="datetimeFigureOut">
               <a:rPr lang="en-US" smtClean="0"/>
-              <a:t>10/28/2018</a:t>
+              <a:t>11/7/2018</a:t>
             </a:fld>
             <a:endParaRPr lang="en-US"/>
           </a:p>
@@ -738,7 +738,7 @@
           <a:p>
             <a:fld id="{78C97017-6FC3-485B-9764-EAC9E56C1D49}" type="datetimeFigureOut">
               <a:rPr lang="en-US" smtClean="0"/>
-              <a:t>10/28/2018</a:t>
+              <a:t>11/7/2018</a:t>
             </a:fld>
             <a:endParaRPr lang="en-US"/>
           </a:p>
@@ -906,7 +906,7 @@
           <a:p>
             <a:fld id="{78C97017-6FC3-485B-9764-EAC9E56C1D49}" type="datetimeFigureOut">
               <a:rPr lang="en-US" smtClean="0"/>
-              <a:t>10/28/2018</a:t>
+              <a:t>11/7/2018</a:t>
             </a:fld>
             <a:endParaRPr lang="en-US"/>
           </a:p>
@@ -1084,7 +1084,7 @@
           <a:p>
             <a:fld id="{78C97017-6FC3-485B-9764-EAC9E56C1D49}" type="datetimeFigureOut">
               <a:rPr lang="en-US" smtClean="0"/>
-              <a:t>10/28/2018</a:t>
+              <a:t>11/7/2018</a:t>
             </a:fld>
             <a:endParaRPr lang="en-US"/>
           </a:p>
@@ -1252,7 +1252,7 @@
           <a:p>
             <a:fld id="{78C97017-6FC3-485B-9764-EAC9E56C1D49}" type="datetimeFigureOut">
               <a:rPr lang="en-US" smtClean="0"/>
-              <a:t>10/28/2018</a:t>
+              <a:t>11/7/2018</a:t>
             </a:fld>
             <a:endParaRPr lang="en-US"/>
           </a:p>
@@ -1497,7 +1497,7 @@
           <a:p>
             <a:fld id="{78C97017-6FC3-485B-9764-EAC9E56C1D49}" type="datetimeFigureOut">
               <a:rPr lang="en-US" smtClean="0"/>
-              <a:t>10/28/2018</a:t>
+              <a:t>11/7/2018</a:t>
             </a:fld>
             <a:endParaRPr lang="en-US"/>
           </a:p>
@@ -1782,7 +1782,7 @@
           <a:p>
             <a:fld id="{78C97017-6FC3-485B-9764-EAC9E56C1D49}" type="datetimeFigureOut">
               <a:rPr lang="en-US" smtClean="0"/>
-              <a:t>10/28/2018</a:t>
+              <a:t>11/7/2018</a:t>
             </a:fld>
             <a:endParaRPr lang="en-US"/>
           </a:p>
@@ -2201,7 +2201,7 @@
           <a:p>
             <a:fld id="{78C97017-6FC3-485B-9764-EAC9E56C1D49}" type="datetimeFigureOut">
               <a:rPr lang="en-US" smtClean="0"/>
-              <a:t>10/28/2018</a:t>
+              <a:t>11/7/2018</a:t>
             </a:fld>
             <a:endParaRPr lang="en-US"/>
           </a:p>
@@ -2318,7 +2318,7 @@
           <a:p>
             <a:fld id="{78C97017-6FC3-485B-9764-EAC9E56C1D49}" type="datetimeFigureOut">
               <a:rPr lang="en-US" smtClean="0"/>
-              <a:t>10/28/2018</a:t>
+              <a:t>11/7/2018</a:t>
             </a:fld>
             <a:endParaRPr lang="en-US"/>
           </a:p>
@@ -2413,7 +2413,7 @@
           <a:p>
             <a:fld id="{78C97017-6FC3-485B-9764-EAC9E56C1D49}" type="datetimeFigureOut">
               <a:rPr lang="en-US" smtClean="0"/>
-              <a:t>10/28/2018</a:t>
+              <a:t>11/7/2018</a:t>
             </a:fld>
             <a:endParaRPr lang="en-US"/>
           </a:p>
@@ -2688,7 +2688,7 @@
           <a:p>
             <a:fld id="{78C97017-6FC3-485B-9764-EAC9E56C1D49}" type="datetimeFigureOut">
               <a:rPr lang="en-US" smtClean="0"/>
-              <a:t>10/28/2018</a:t>
+              <a:t>11/7/2018</a:t>
             </a:fld>
             <a:endParaRPr lang="en-US"/>
           </a:p>
@@ -2940,7 +2940,7 @@
           <a:p>
             <a:fld id="{78C97017-6FC3-485B-9764-EAC9E56C1D49}" type="datetimeFigureOut">
               <a:rPr lang="en-US" smtClean="0"/>
-              <a:t>10/28/2018</a:t>
+              <a:t>11/7/2018</a:t>
             </a:fld>
             <a:endParaRPr lang="en-US"/>
           </a:p>
@@ -3151,7 +3151,7 @@
           <a:p>
             <a:fld id="{78C97017-6FC3-485B-9764-EAC9E56C1D49}" type="datetimeFigureOut">
               <a:rPr lang="en-US" smtClean="0"/>
-              <a:t>10/28/2018</a:t>
+              <a:t>11/7/2018</a:t>
             </a:fld>
             <a:endParaRPr lang="en-US"/>
           </a:p>
@@ -3528,30 +3528,34 @@
       </p:grpSpPr>
       <p:sp>
         <p:nvSpPr>
-          <p:cNvPr id="81" name="Rectangle 65"/>
+          <p:cNvPr id="56" name="Rectangle 65">
+            <a:extLst>
+              <a:ext uri="{FF2B5EF4-FFF2-40B4-BE49-F238E27FC236}">
+                <a16:creationId xmlns:a16="http://schemas.microsoft.com/office/drawing/2014/main" id="{9BAEC254-6AA8-4893-B087-60B17DFA83F7}"/>
+              </a:ext>
+            </a:extLst>
+          </p:cNvPr>
           <p:cNvSpPr/>
           <p:nvPr/>
         </p:nvSpPr>
         <p:spPr>
           <a:xfrm>
-            <a:off x="-2122184" y="0"/>
-            <a:ext cx="4861063" cy="6858000"/>
+            <a:off x="6142718" y="-4342"/>
+            <a:ext cx="2391682" cy="5638800"/>
           </a:xfrm>
           <a:prstGeom prst="roundRect">
             <a:avLst>
-              <a:gd name="adj" fmla="val 0"/>
+              <a:gd name="adj" fmla="val 6819"/>
             </a:avLst>
           </a:prstGeom>
           <a:solidFill>
-            <a:schemeClr val="accent1">
+            <a:schemeClr val="accent5">
               <a:lumMod val="20000"/>
               <a:lumOff val="80000"/>
             </a:schemeClr>
           </a:solidFill>
           <a:ln w="19050">
-            <a:solidFill>
-              <a:schemeClr val="accent1"/>
-            </a:solidFill>
+            <a:noFill/>
           </a:ln>
           <a:effectLst/>
         </p:spPr>
@@ -3575,83 +3579,87 @@
           <a:p>
             <a:endParaRPr lang="en-US" sz="1200" b="1" dirty="0">
               <a:solidFill>
-                <a:srgbClr val="0070C0"/>
+                <a:srgbClr val="31859C"/>
               </a:solidFill>
             </a:endParaRPr>
           </a:p>
           <a:p>
+            <a:r>
+              <a:rPr lang="en-US" sz="1200" b="1" dirty="0">
+                <a:solidFill>
+                  <a:srgbClr val="31859C"/>
+                </a:solidFill>
+              </a:rPr>
+              <a:t>Common</a:t>
+            </a:r>
+          </a:p>
+          <a:p>
             <a:endParaRPr lang="en-US" sz="1200" b="1" dirty="0">
               <a:solidFill>
-                <a:srgbClr val="0070C0"/>
+                <a:srgbClr val="31859C"/>
               </a:solidFill>
             </a:endParaRPr>
           </a:p>
           <a:p>
             <a:endParaRPr lang="en-US" sz="1200" b="1" dirty="0">
               <a:solidFill>
-                <a:srgbClr val="0070C0"/>
+                <a:srgbClr val="31859C"/>
               </a:solidFill>
             </a:endParaRPr>
           </a:p>
           <a:p>
             <a:endParaRPr lang="en-US" sz="1200" b="1" dirty="0">
               <a:solidFill>
-                <a:srgbClr val="0070C0"/>
+                <a:srgbClr val="31859C"/>
               </a:solidFill>
             </a:endParaRPr>
           </a:p>
           <a:p>
             <a:endParaRPr lang="en-US" sz="1200" b="1" dirty="0">
               <a:solidFill>
-                <a:srgbClr val="0070C0"/>
+                <a:srgbClr val="31859C"/>
               </a:solidFill>
             </a:endParaRPr>
           </a:p>
           <a:p>
             <a:endParaRPr lang="en-US" sz="1200" b="1" dirty="0">
               <a:solidFill>
-                <a:srgbClr val="0070C0"/>
+                <a:srgbClr val="31859C"/>
               </a:solidFill>
             </a:endParaRPr>
           </a:p>
-          <a:p>
-            <a:r>
-              <a:rPr lang="en-US" sz="1200" b="1" dirty="0">
-                <a:solidFill>
-                  <a:srgbClr val="0070C0"/>
-                </a:solidFill>
-              </a:rPr>
-              <a:t>MainApp</a:t>
-            </a:r>
-            <a:endParaRPr lang="en-SG" sz="1200" b="1" dirty="0">
-              <a:solidFill>
-                <a:srgbClr val="0070C0"/>
-              </a:solidFill>
-            </a:endParaRPr>
-          </a:p>
-        </p:txBody>
-      </p:sp>
-      <p:sp>
-        <p:nvSpPr>
-          <p:cNvPr id="2" name="Rectangle 62"/>
+        </p:txBody>
+      </p:sp>
+      <p:sp>
+        <p:nvSpPr>
+          <p:cNvPr id="54" name="Rectangle 65">
+            <a:extLst>
+              <a:ext uri="{FF2B5EF4-FFF2-40B4-BE49-F238E27FC236}">
+                <a16:creationId xmlns:a16="http://schemas.microsoft.com/office/drawing/2014/main" id="{498619E0-23FA-445E-AF85-1FE8E4D2B12B}"/>
+              </a:ext>
+            </a:extLst>
+          </p:cNvPr>
           <p:cNvSpPr/>
           <p:nvPr/>
         </p:nvSpPr>
         <p:spPr>
           <a:xfrm>
-            <a:off x="-1114593" y="842974"/>
-            <a:ext cx="1455629" cy="346760"/>
-          </a:xfrm>
-          <a:prstGeom prst="rect">
-            <a:avLst/>
+            <a:off x="4182838" y="-4342"/>
+            <a:ext cx="1955550" cy="5638800"/>
+          </a:xfrm>
+          <a:prstGeom prst="roundRect">
+            <a:avLst>
+              <a:gd name="adj" fmla="val 6819"/>
+            </a:avLst>
           </a:prstGeom>
           <a:solidFill>
-            <a:srgbClr val="0070C0"/>
+            <a:schemeClr val="accent3">
+              <a:lumMod val="20000"/>
+              <a:lumOff val="80000"/>
+            </a:schemeClr>
           </a:solidFill>
           <a:ln w="19050">
-            <a:solidFill>
-              <a:srgbClr val="0070C0"/>
-            </a:solidFill>
+            <a:noFill/>
           </a:ln>
           <a:effectLst/>
         </p:spPr>
@@ -3670,12 +3678,203 @@
           </a:fontRef>
         </p:style>
         <p:txBody>
+          <a:bodyPr rtlCol="0" anchor="t"/>
+          <a:lstStyle/>
+          <a:p>
+            <a:endParaRPr lang="en-US" sz="1200" b="1" dirty="0">
+              <a:solidFill>
+                <a:srgbClr val="0070C0"/>
+              </a:solidFill>
+            </a:endParaRPr>
+          </a:p>
+          <a:p>
+            <a:r>
+              <a:rPr lang="en-US" sz="1200" b="1" dirty="0">
+                <a:solidFill>
+                  <a:srgbClr val="00B050"/>
+                </a:solidFill>
+              </a:rPr>
+              <a:t>File</a:t>
+            </a:r>
+          </a:p>
+          <a:p>
+            <a:endParaRPr lang="en-US" sz="1200" b="1" dirty="0">
+              <a:solidFill>
+                <a:srgbClr val="0070C0"/>
+              </a:solidFill>
+            </a:endParaRPr>
+          </a:p>
+          <a:p>
+            <a:endParaRPr lang="en-US" sz="1200" b="1" dirty="0">
+              <a:solidFill>
+                <a:srgbClr val="0070C0"/>
+              </a:solidFill>
+            </a:endParaRPr>
+          </a:p>
+          <a:p>
+            <a:endParaRPr lang="en-US" sz="1200" b="1" dirty="0">
+              <a:solidFill>
+                <a:srgbClr val="0070C0"/>
+              </a:solidFill>
+            </a:endParaRPr>
+          </a:p>
+          <a:p>
+            <a:endParaRPr lang="en-US" sz="1200" b="1" dirty="0">
+              <a:solidFill>
+                <a:srgbClr val="0070C0"/>
+              </a:solidFill>
+            </a:endParaRPr>
+          </a:p>
+        </p:txBody>
+      </p:sp>
+      <p:sp>
+        <p:nvSpPr>
+          <p:cNvPr id="121" name="Rectangle 65">
+            <a:extLst>
+              <a:ext uri="{FF2B5EF4-FFF2-40B4-BE49-F238E27FC236}">
+                <a16:creationId xmlns:a16="http://schemas.microsoft.com/office/drawing/2014/main" id="{6D277770-6951-4B1F-A7E2-AF04F5D8CDB9}"/>
+              </a:ext>
+            </a:extLst>
+          </p:cNvPr>
+          <p:cNvSpPr/>
+          <p:nvPr/>
+        </p:nvSpPr>
+        <p:spPr>
+          <a:xfrm>
+            <a:off x="1138680" y="0"/>
+            <a:ext cx="3035006" cy="5638800"/>
+          </a:xfrm>
+          <a:prstGeom prst="roundRect">
+            <a:avLst>
+              <a:gd name="adj" fmla="val 5021"/>
+            </a:avLst>
+          </a:prstGeom>
+          <a:solidFill>
+            <a:schemeClr val="accent6">
+              <a:lumMod val="20000"/>
+              <a:lumOff val="80000"/>
+            </a:schemeClr>
+          </a:solidFill>
+          <a:ln w="19050">
+            <a:noFill/>
+          </a:ln>
+          <a:effectLst/>
+        </p:spPr>
+        <p:style>
+          <a:lnRef idx="1">
+            <a:schemeClr val="accent2"/>
+          </a:lnRef>
+          <a:fillRef idx="2">
+            <a:schemeClr val="accent2"/>
+          </a:fillRef>
+          <a:effectRef idx="1">
+            <a:schemeClr val="accent2"/>
+          </a:effectRef>
+          <a:fontRef idx="minor">
+            <a:schemeClr val="dk1"/>
+          </a:fontRef>
+        </p:style>
+        <p:txBody>
+          <a:bodyPr rtlCol="0" anchor="t"/>
+          <a:lstStyle/>
+          <a:p>
+            <a:endParaRPr lang="en-US" sz="1200" b="1" dirty="0">
+              <a:solidFill>
+                <a:schemeClr val="accent6"/>
+              </a:solidFill>
+            </a:endParaRPr>
+          </a:p>
+          <a:p>
+            <a:r>
+              <a:rPr lang="en-US" sz="1200" b="1" dirty="0">
+                <a:solidFill>
+                  <a:schemeClr val="accent6"/>
+                </a:solidFill>
+              </a:rPr>
+              <a:t>Logic</a:t>
+            </a:r>
+          </a:p>
+          <a:p>
+            <a:endParaRPr lang="en-US" sz="1200" b="1" dirty="0">
+              <a:solidFill>
+                <a:schemeClr val="accent6"/>
+              </a:solidFill>
+            </a:endParaRPr>
+          </a:p>
+          <a:p>
+            <a:endParaRPr lang="en-US" sz="1200" b="1" dirty="0">
+              <a:solidFill>
+                <a:schemeClr val="accent6"/>
+              </a:solidFill>
+            </a:endParaRPr>
+          </a:p>
+          <a:p>
+            <a:endParaRPr lang="en-US" sz="1200" b="1" dirty="0">
+              <a:solidFill>
+                <a:schemeClr val="accent6"/>
+              </a:solidFill>
+            </a:endParaRPr>
+          </a:p>
+          <a:p>
+            <a:endParaRPr lang="en-US" sz="1200" b="1" dirty="0">
+              <a:solidFill>
+                <a:schemeClr val="accent6"/>
+              </a:solidFill>
+            </a:endParaRPr>
+          </a:p>
+        </p:txBody>
+      </p:sp>
+      <p:sp>
+        <p:nvSpPr>
+          <p:cNvPr id="122" name="Rectangle 62">
+            <a:extLst>
+              <a:ext uri="{FF2B5EF4-FFF2-40B4-BE49-F238E27FC236}">
+                <a16:creationId xmlns:a16="http://schemas.microsoft.com/office/drawing/2014/main" id="{4403717D-7216-426C-B5F9-9C0C8D62945B}"/>
+              </a:ext>
+            </a:extLst>
+          </p:cNvPr>
+          <p:cNvSpPr/>
+          <p:nvPr/>
+        </p:nvSpPr>
+        <p:spPr>
+          <a:xfrm>
+            <a:off x="2348242" y="1150984"/>
+            <a:ext cx="1455629" cy="346760"/>
+          </a:xfrm>
+          <a:prstGeom prst="rect">
+            <a:avLst/>
+          </a:prstGeom>
+          <a:solidFill>
+            <a:schemeClr val="accent6"/>
+          </a:solidFill>
+          <a:ln w="19050">
+            <a:solidFill>
+              <a:schemeClr val="accent6"/>
+            </a:solidFill>
+          </a:ln>
+          <a:effectLst/>
+        </p:spPr>
+        <p:style>
+          <a:lnRef idx="1">
+            <a:schemeClr val="accent2"/>
+          </a:lnRef>
+          <a:fillRef idx="2">
+            <a:schemeClr val="accent2"/>
+          </a:fillRef>
+          <a:effectRef idx="1">
+            <a:schemeClr val="accent2"/>
+          </a:effectRef>
+          <a:fontRef idx="minor">
+            <a:schemeClr val="dk1"/>
+          </a:fontRef>
+        </p:style>
+        <p:txBody>
           <a:bodyPr rtlCol="0" anchor="ctr"/>
           <a:lstStyle/>
           <a:p>
             <a:pPr algn="ctr"/>
             <a:r>
-              <a:rPr lang="en-US" sz="1600" dirty="0">
+              <a:rPr lang="en-US" sz="1600">
                 <a:solidFill>
                   <a:schemeClr val="bg1"/>
                 </a:solidFill>
@@ -3692,24 +3891,30 @@
       </p:sp>
       <p:cxnSp>
         <p:nvCxnSpPr>
-          <p:cNvPr id="5" name="Straight Connector 4"/>
+          <p:cNvPr id="124" name="Straight Connector 123">
+            <a:extLst>
+              <a:ext uri="{FF2B5EF4-FFF2-40B4-BE49-F238E27FC236}">
+                <a16:creationId xmlns:a16="http://schemas.microsoft.com/office/drawing/2014/main" id="{962A441C-E310-4768-BDE8-711B51E4A66E}"/>
+              </a:ext>
+            </a:extLst>
+          </p:cNvPr>
           <p:cNvCxnSpPr>
             <a:cxnSpLocks/>
-            <a:stCxn id="2" idx="2"/>
+            <a:stCxn id="122" idx="2"/>
           </p:cNvCxnSpPr>
           <p:nvPr/>
         </p:nvCxnSpPr>
         <p:spPr>
           <a:xfrm>
-            <a:off x="-386778" y="1189734"/>
-            <a:ext cx="0" cy="4374377"/>
+            <a:off x="3076057" y="1497744"/>
+            <a:ext cx="0" cy="3683856"/>
           </a:xfrm>
           <a:prstGeom prst="line">
             <a:avLst/>
           </a:prstGeom>
           <a:ln w="19050">
             <a:solidFill>
-              <a:srgbClr val="0070C0"/>
+              <a:schemeClr val="accent6"/>
             </a:solidFill>
             <a:prstDash val="sysDash"/>
           </a:ln>
@@ -3732,37 +3937,42 @@
       </p:cxnSp>
       <p:sp>
         <p:nvSpPr>
-          <p:cNvPr id="6" name="Rectangle 5"/>
+          <p:cNvPr id="126" name="Rectangle 125">
+            <a:extLst>
+              <a:ext uri="{FF2B5EF4-FFF2-40B4-BE49-F238E27FC236}">
+                <a16:creationId xmlns:a16="http://schemas.microsoft.com/office/drawing/2014/main" id="{9390D805-5CE0-4EE9-ABFC-9A0EB03FFBF1}"/>
+              </a:ext>
+            </a:extLst>
+          </p:cNvPr>
           <p:cNvSpPr/>
           <p:nvPr/>
         </p:nvSpPr>
         <p:spPr>
           <a:xfrm>
-            <a:off x="-451925" y="1404076"/>
-            <a:ext cx="134393" cy="4050723"/>
+            <a:off x="3010910" y="1712087"/>
+            <a:ext cx="134393" cy="3230804"/>
           </a:xfrm>
           <a:prstGeom prst="rect">
             <a:avLst/>
           </a:prstGeom>
           <a:solidFill>
-            <a:srgbClr val="0070C0"/>
+            <a:schemeClr val="accent6"/>
           </a:solidFill>
           <a:ln>
             <a:solidFill>
-              <a:srgbClr val="0070C0"/>
+              <a:schemeClr val="accent6"/>
             </a:solidFill>
           </a:ln>
-          <a:effectLst/>
         </p:spPr>
         <p:style>
-          <a:lnRef idx="1">
-            <a:schemeClr val="accent3"/>
+          <a:lnRef idx="2">
+            <a:schemeClr val="accent6"/>
           </a:lnRef>
-          <a:fillRef idx="2">
-            <a:schemeClr val="accent3"/>
+          <a:fillRef idx="1">
+            <a:schemeClr val="lt1"/>
           </a:fillRef>
-          <a:effectRef idx="1">
-            <a:schemeClr val="accent3"/>
+          <a:effectRef idx="0">
+            <a:schemeClr val="accent6"/>
           </a:effectRef>
           <a:fontRef idx="minor">
             <a:schemeClr val="dk1"/>
@@ -3779,37 +3989,45 @@
       </p:sp>
       <p:sp>
         <p:nvSpPr>
-          <p:cNvPr id="16" name="Rectangle 62"/>
+          <p:cNvPr id="127" name="Rectangle 62">
+            <a:extLst>
+              <a:ext uri="{FF2B5EF4-FFF2-40B4-BE49-F238E27FC236}">
+                <a16:creationId xmlns:a16="http://schemas.microsoft.com/office/drawing/2014/main" id="{7EEDDFE7-75A4-4B30-8C91-36583BDCBA02}"/>
+              </a:ext>
+            </a:extLst>
+          </p:cNvPr>
           <p:cNvSpPr/>
           <p:nvPr/>
         </p:nvSpPr>
         <p:spPr>
           <a:xfrm>
-            <a:off x="1061370" y="826846"/>
+            <a:off x="6781800" y="1134856"/>
             <a:ext cx="1219200" cy="467684"/>
           </a:xfrm>
           <a:prstGeom prst="rect">
             <a:avLst/>
           </a:prstGeom>
           <a:solidFill>
-            <a:schemeClr val="accent2"/>
+            <a:srgbClr val="31859C"/>
           </a:solidFill>
           <a:ln w="19050">
             <a:solidFill>
-              <a:schemeClr val="accent2"/>
+              <a:schemeClr val="accent5">
+                <a:lumMod val="75000"/>
+              </a:schemeClr>
             </a:solidFill>
           </a:ln>
           <a:effectLst/>
         </p:spPr>
         <p:style>
           <a:lnRef idx="1">
-            <a:schemeClr val="accent2"/>
+            <a:schemeClr val="accent5"/>
           </a:lnRef>
           <a:fillRef idx="2">
-            <a:schemeClr val="accent2"/>
+            <a:schemeClr val="accent5"/>
           </a:fillRef>
           <a:effectRef idx="1">
-            <a:schemeClr val="accent2"/>
+            <a:schemeClr val="accent5"/>
           </a:effectRef>
           <a:fontRef idx="minor">
             <a:schemeClr val="dk1"/>
@@ -3821,14 +4039,14 @@
           <a:p>
             <a:pPr algn="ctr"/>
             <a:r>
-              <a:rPr lang="en-US" sz="1600" dirty="0">
+              <a:rPr lang="en-US" sz="1400" dirty="0">
                 <a:solidFill>
                   <a:schemeClr val="bg1"/>
                 </a:solidFill>
               </a:rPr>
               <a:t>:FileUtil</a:t>
             </a:r>
-            <a:endParaRPr lang="en-SG" sz="1600" dirty="0">
+            <a:endParaRPr lang="en-SG" sz="1400" dirty="0">
               <a:solidFill>
                 <a:schemeClr val="bg1"/>
               </a:solidFill>
@@ -3838,24 +4056,30 @@
       </p:sp>
       <p:cxnSp>
         <p:nvCxnSpPr>
-          <p:cNvPr id="17" name="Straight Connector 16"/>
+          <p:cNvPr id="129" name="Straight Connector 128">
+            <a:extLst>
+              <a:ext uri="{FF2B5EF4-FFF2-40B4-BE49-F238E27FC236}">
+                <a16:creationId xmlns:a16="http://schemas.microsoft.com/office/drawing/2014/main" id="{0573B46B-8A3F-429D-969B-1603C373E282}"/>
+              </a:ext>
+            </a:extLst>
+          </p:cNvPr>
           <p:cNvCxnSpPr>
             <a:cxnSpLocks/>
-            <a:stCxn id="16" idx="2"/>
+            <a:stCxn id="127" idx="2"/>
           </p:cNvCxnSpPr>
           <p:nvPr/>
         </p:nvCxnSpPr>
         <p:spPr>
           <a:xfrm flipH="1">
-            <a:off x="1670145" y="1294530"/>
-            <a:ext cx="825" cy="2483353"/>
+            <a:off x="7387937" y="1602540"/>
+            <a:ext cx="3463" cy="3429870"/>
           </a:xfrm>
           <a:prstGeom prst="line">
             <a:avLst/>
           </a:prstGeom>
           <a:ln w="19050">
             <a:solidFill>
-              <a:schemeClr val="accent2"/>
+              <a:srgbClr val="31859C"/>
             </a:solidFill>
             <a:prstDash val="sysDash"/>
           </a:ln>
@@ -3878,37 +4102,45 @@
       </p:cxnSp>
       <p:sp>
         <p:nvSpPr>
-          <p:cNvPr id="18" name="Rectangle 17"/>
+          <p:cNvPr id="130" name="Rectangle 129">
+            <a:extLst>
+              <a:ext uri="{FF2B5EF4-FFF2-40B4-BE49-F238E27FC236}">
+                <a16:creationId xmlns:a16="http://schemas.microsoft.com/office/drawing/2014/main" id="{39497B21-8F79-4EE5-BFC9-46FFE1872A99}"/>
+              </a:ext>
+            </a:extLst>
+          </p:cNvPr>
           <p:cNvSpPr/>
           <p:nvPr/>
         </p:nvSpPr>
         <p:spPr>
           <a:xfrm>
-            <a:off x="1607255" y="1583104"/>
-            <a:ext cx="120505" cy="2106147"/>
+            <a:off x="7327685" y="3660811"/>
+            <a:ext cx="120505" cy="1192248"/>
           </a:xfrm>
           <a:prstGeom prst="rect">
             <a:avLst/>
           </a:prstGeom>
           <a:solidFill>
-            <a:schemeClr val="accent2"/>
+            <a:srgbClr val="31859C"/>
           </a:solidFill>
-          <a:ln>
+          <a:ln w="19050">
             <a:solidFill>
-              <a:schemeClr val="accent2"/>
+              <a:schemeClr val="accent5">
+                <a:lumMod val="75000"/>
+              </a:schemeClr>
             </a:solidFill>
           </a:ln>
           <a:effectLst/>
         </p:spPr>
         <p:style>
           <a:lnRef idx="1">
-            <a:schemeClr val="accent3"/>
+            <a:schemeClr val="accent5"/>
           </a:lnRef>
           <a:fillRef idx="2">
-            <a:schemeClr val="accent3"/>
+            <a:schemeClr val="accent5"/>
           </a:fillRef>
           <a:effectRef idx="1">
-            <a:schemeClr val="accent3"/>
+            <a:schemeClr val="accent5"/>
           </a:effectRef>
           <a:fontRef idx="minor">
             <a:schemeClr val="dk1"/>
@@ -3921,7 +4153,7 @@
             <a:pPr algn="ctr"/>
             <a:endParaRPr lang="en-SG" sz="1400">
               <a:solidFill>
-                <a:schemeClr val="dk1"/>
+                <a:schemeClr val="bg1"/>
               </a:solidFill>
             </a:endParaRPr>
           </a:p>
@@ -3929,13 +4161,19 @@
       </p:sp>
       <p:cxnSp>
         <p:nvCxnSpPr>
-          <p:cNvPr id="23" name="Straight Arrow Connector 22"/>
+          <p:cNvPr id="131" name="Straight Arrow Connector 130">
+            <a:extLst>
+              <a:ext uri="{FF2B5EF4-FFF2-40B4-BE49-F238E27FC236}">
+                <a16:creationId xmlns:a16="http://schemas.microsoft.com/office/drawing/2014/main" id="{23E21B4A-02AD-42C1-9132-FEA309FCE6F8}"/>
+              </a:ext>
+            </a:extLst>
+          </p:cNvPr>
           <p:cNvCxnSpPr/>
           <p:nvPr/>
         </p:nvCxnSpPr>
         <p:spPr>
           <a:xfrm>
-            <a:off x="-1578601" y="1413919"/>
+            <a:off x="1884234" y="1721929"/>
             <a:ext cx="1119851" cy="0"/>
           </a:xfrm>
           <a:prstGeom prst="straightConnector1">
@@ -3943,7 +4181,7 @@
           </a:prstGeom>
           <a:ln w="19050">
             <a:solidFill>
-              <a:schemeClr val="accent1"/>
+              <a:schemeClr val="accent6"/>
             </a:solidFill>
             <a:tailEnd type="arrow"/>
           </a:ln>
@@ -3965,14 +4203,20 @@
       </p:cxnSp>
       <p:sp>
         <p:nvSpPr>
-          <p:cNvPr id="26" name="TextBox 25"/>
+          <p:cNvPr id="134" name="TextBox 133">
+            <a:extLst>
+              <a:ext uri="{FF2B5EF4-FFF2-40B4-BE49-F238E27FC236}">
+                <a16:creationId xmlns:a16="http://schemas.microsoft.com/office/drawing/2014/main" id="{B38D7C8F-ADD8-403C-A556-FEA9F2ABCF69}"/>
+              </a:ext>
+            </a:extLst>
+          </p:cNvPr>
           <p:cNvSpPr txBox="1"/>
           <p:nvPr/>
         </p:nvSpPr>
         <p:spPr>
           <a:xfrm>
-            <a:off x="-2135883" y="1439519"/>
-            <a:ext cx="1624103" cy="430887"/>
+            <a:off x="1326952" y="1747529"/>
+            <a:ext cx="1624103" cy="646331"/>
           </a:xfrm>
           <a:prstGeom prst="rect">
             <a:avLst/>
@@ -3989,10 +4233,10 @@
             <a:r>
               <a:rPr lang="en-US" sz="1400" dirty="0">
                 <a:solidFill>
-                  <a:srgbClr val="0070C0"/>
+                  <a:schemeClr val="accent6"/>
                 </a:solidFill>
               </a:rPr>
-              <a:t>execute</a:t>
+              <a:t>addSampleTextFile</a:t>
             </a:r>
           </a:p>
           <a:p>
@@ -4000,24 +4244,30 @@
             <a:r>
               <a:rPr lang="en-US" sz="1400" dirty="0">
                 <a:solidFill>
-                  <a:srgbClr val="0070C0"/>
+                  <a:schemeClr val="accent6"/>
                 </a:solidFill>
               </a:rPr>
-              <a:t>(“/scripts/”)</a:t>
-            </a:r>
-          </a:p>
-        </p:txBody>
-      </p:sp>
-      <p:sp>
-        <p:nvSpPr>
-          <p:cNvPr id="80" name="TextBox 79"/>
+              <a:t>(scriptFolder, defaultLocation)</a:t>
+            </a:r>
+          </a:p>
+        </p:txBody>
+      </p:sp>
+      <p:sp>
+        <p:nvSpPr>
+          <p:cNvPr id="135" name="TextBox 134">
+            <a:extLst>
+              <a:ext uri="{FF2B5EF4-FFF2-40B4-BE49-F238E27FC236}">
+                <a16:creationId xmlns:a16="http://schemas.microsoft.com/office/drawing/2014/main" id="{D354A627-0E9E-412A-BD39-C1DA8D67A614}"/>
+              </a:ext>
+            </a:extLst>
+          </p:cNvPr>
           <p:cNvSpPr txBox="1"/>
           <p:nvPr/>
         </p:nvSpPr>
         <p:spPr>
           <a:xfrm>
-            <a:off x="4965" y="1654962"/>
-            <a:ext cx="1323411" cy="646331"/>
+            <a:off x="3478945" y="3732668"/>
+            <a:ext cx="3569861" cy="215444"/>
           </a:xfrm>
           <a:prstGeom prst="rect">
             <a:avLst/>
@@ -4045,1266 +4295,10 @@
             <a:r>
               <a:rPr lang="en-US" dirty="0">
                 <a:solidFill>
-                  <a:srgbClr val="FF0000"/>
+                  <a:srgbClr val="31859C"/>
                 </a:solidFill>
               </a:rPr>
-              <a:t>getPath</a:t>
-            </a:r>
-          </a:p>
-          <a:p>
-            <a:pPr algn="ctr"/>
-            <a:r>
-              <a:rPr lang="en-US" dirty="0">
-                <a:solidFill>
-                  <a:srgbClr val="FF0000"/>
-                </a:solidFill>
-              </a:rPr>
-              <a:t>(ProjectLocation + “/Scripts/”)</a:t>
-            </a:r>
-          </a:p>
-        </p:txBody>
-      </p:sp>
-      <p:cxnSp>
-        <p:nvCxnSpPr>
-          <p:cNvPr id="67" name="Straight Arrow Connector 66">
-            <a:extLst>
-              <a:ext uri="{FF2B5EF4-FFF2-40B4-BE49-F238E27FC236}">
-                <a16:creationId xmlns:a16="http://schemas.microsoft.com/office/drawing/2014/main" id="{D881596E-177C-4FDC-8E60-CAB90B3D5FAB}"/>
-              </a:ext>
-            </a:extLst>
-          </p:cNvPr>
-          <p:cNvCxnSpPr>
-            <a:cxnSpLocks/>
-          </p:cNvCxnSpPr>
-          <p:nvPr/>
-        </p:nvCxnSpPr>
-        <p:spPr>
-          <a:xfrm>
-            <a:off x="-337983" y="1635621"/>
-            <a:ext cx="1939184" cy="2665"/>
-          </a:xfrm>
-          <a:prstGeom prst="straightConnector1">
-            <a:avLst/>
-          </a:prstGeom>
-          <a:ln w="19050">
-            <a:solidFill>
-              <a:schemeClr val="accent2"/>
-            </a:solidFill>
-            <a:tailEnd type="arrow"/>
-          </a:ln>
-        </p:spPr>
-        <p:style>
-          <a:lnRef idx="1">
-            <a:schemeClr val="accent1"/>
-          </a:lnRef>
-          <a:fillRef idx="0">
-            <a:schemeClr val="accent1"/>
-          </a:fillRef>
-          <a:effectRef idx="0">
-            <a:schemeClr val="accent1"/>
-          </a:effectRef>
-          <a:fontRef idx="minor">
-            <a:schemeClr val="tx1"/>
-          </a:fontRef>
-        </p:style>
-      </p:cxnSp>
-      <p:sp>
-        <p:nvSpPr>
-          <p:cNvPr id="132" name="TextBox 131">
-            <a:extLst>
-              <a:ext uri="{FF2B5EF4-FFF2-40B4-BE49-F238E27FC236}">
-                <a16:creationId xmlns:a16="http://schemas.microsoft.com/office/drawing/2014/main" id="{5B36CA47-36CF-4B54-92D7-72453E24F63A}"/>
-              </a:ext>
-            </a:extLst>
-          </p:cNvPr>
-          <p:cNvSpPr txBox="1"/>
-          <p:nvPr/>
-        </p:nvSpPr>
-        <p:spPr>
-          <a:xfrm>
-            <a:off x="-133376" y="3607427"/>
-            <a:ext cx="1555395" cy="215444"/>
-          </a:xfrm>
-          <a:prstGeom prst="rect">
-            <a:avLst/>
-          </a:prstGeom>
-          <a:noFill/>
-        </p:spPr>
-        <p:txBody>
-          <a:bodyPr wrap="square" lIns="0" tIns="0" rIns="0" bIns="0" rtlCol="0">
-            <a:spAutoFit/>
-          </a:bodyPr>
-          <a:lstStyle>
-            <a:defPPr>
-              <a:defRPr lang="en-US"/>
-            </a:defPPr>
-            <a:lvl1pPr algn="r">
-              <a:defRPr sz="1400">
-                <a:solidFill>
-                  <a:srgbClr val="0070C0"/>
-                </a:solidFill>
-              </a:defRPr>
-            </a:lvl1pPr>
-          </a:lstStyle>
-          <a:p>
-            <a:r>
-              <a:rPr lang="en-US" dirty="0">
-                <a:solidFill>
-                  <a:srgbClr val="FF0000"/>
-                </a:solidFill>
-              </a:rPr>
-              <a:t>isScriptFolderPresent</a:t>
-            </a:r>
-          </a:p>
-        </p:txBody>
-      </p:sp>
-      <p:cxnSp>
-        <p:nvCxnSpPr>
-          <p:cNvPr id="133" name="Straight Arrow Connector 132">
-            <a:extLst>
-              <a:ext uri="{FF2B5EF4-FFF2-40B4-BE49-F238E27FC236}">
-                <a16:creationId xmlns:a16="http://schemas.microsoft.com/office/drawing/2014/main" id="{19DDEF1A-58FB-47FF-B9B9-A7AD79969B1C}"/>
-              </a:ext>
-            </a:extLst>
-          </p:cNvPr>
-          <p:cNvCxnSpPr>
-            <a:cxnSpLocks/>
-          </p:cNvCxnSpPr>
-          <p:nvPr/>
-        </p:nvCxnSpPr>
-        <p:spPr>
-          <a:xfrm>
-            <a:off x="-337983" y="3582911"/>
-            <a:ext cx="1939184" cy="0"/>
-          </a:xfrm>
-          <a:prstGeom prst="straightConnector1">
-            <a:avLst/>
-          </a:prstGeom>
-          <a:ln w="19050">
-            <a:solidFill>
-              <a:schemeClr val="accent2"/>
-            </a:solidFill>
-            <a:prstDash val="sysDash"/>
-            <a:headEnd type="arrow" w="med" len="med"/>
-            <a:tailEnd type="none" w="med" len="med"/>
-          </a:ln>
-        </p:spPr>
-        <p:style>
-          <a:lnRef idx="1">
-            <a:schemeClr val="accent1"/>
-          </a:lnRef>
-          <a:fillRef idx="0">
-            <a:schemeClr val="accent1"/>
-          </a:fillRef>
-          <a:effectRef idx="0">
-            <a:schemeClr val="accent1"/>
-          </a:effectRef>
-          <a:fontRef idx="minor">
-            <a:schemeClr val="tx1"/>
-          </a:fontRef>
-        </p:style>
-      </p:cxnSp>
-      <p:sp>
-        <p:nvSpPr>
-          <p:cNvPr id="164" name="Rectangle 163">
-            <a:extLst>
-              <a:ext uri="{FF2B5EF4-FFF2-40B4-BE49-F238E27FC236}">
-                <a16:creationId xmlns:a16="http://schemas.microsoft.com/office/drawing/2014/main" id="{3B370556-BD77-4474-9FDA-6B58DFCEEB59}"/>
-              </a:ext>
-            </a:extLst>
-          </p:cNvPr>
-          <p:cNvSpPr/>
-          <p:nvPr/>
-        </p:nvSpPr>
-        <p:spPr>
-          <a:xfrm>
-            <a:off x="-1955938" y="3861452"/>
-            <a:ext cx="4654856" cy="1466738"/>
-          </a:xfrm>
-          <a:prstGeom prst="rect">
-            <a:avLst/>
-          </a:prstGeom>
-          <a:solidFill>
-            <a:schemeClr val="accent1">
-              <a:alpha val="25000"/>
-            </a:schemeClr>
-          </a:solidFill>
-          <a:ln>
-            <a:noFill/>
-          </a:ln>
-        </p:spPr>
-        <p:style>
-          <a:lnRef idx="2">
-            <a:schemeClr val="accent1">
-              <a:shade val="50000"/>
-            </a:schemeClr>
-          </a:lnRef>
-          <a:fillRef idx="1">
-            <a:schemeClr val="accent1"/>
-          </a:fillRef>
-          <a:effectRef idx="0">
-            <a:schemeClr val="accent1"/>
-          </a:effectRef>
-          <a:fontRef idx="minor">
-            <a:schemeClr val="lt1"/>
-          </a:fontRef>
-        </p:style>
-        <p:txBody>
-          <a:bodyPr rtlCol="0" anchor="ctr"/>
-          <a:lstStyle/>
-          <a:p>
-            <a:pPr algn="ctr"/>
-            <a:endParaRPr lang="en-SG"/>
-          </a:p>
-        </p:txBody>
-      </p:sp>
-      <p:sp>
-        <p:nvSpPr>
-          <p:cNvPr id="167" name="Rectangle: Single Corner Snipped 166">
-            <a:extLst>
-              <a:ext uri="{FF2B5EF4-FFF2-40B4-BE49-F238E27FC236}">
-                <a16:creationId xmlns:a16="http://schemas.microsoft.com/office/drawing/2014/main" id="{69B1AD43-7D1B-445C-A7CB-7C248EE3953C}"/>
-              </a:ext>
-            </a:extLst>
-          </p:cNvPr>
-          <p:cNvSpPr/>
-          <p:nvPr/>
-        </p:nvSpPr>
-        <p:spPr>
-          <a:xfrm rot="10800000" flipH="1">
-            <a:off x="-1915976" y="3885196"/>
-            <a:ext cx="533400" cy="287343"/>
-          </a:xfrm>
-          <a:prstGeom prst="snip1Rect">
-            <a:avLst/>
-          </a:prstGeom>
-          <a:solidFill>
-            <a:schemeClr val="accent1">
-              <a:alpha val="72000"/>
-            </a:schemeClr>
-          </a:solidFill>
-          <a:ln>
-            <a:noFill/>
-          </a:ln>
-        </p:spPr>
-        <p:style>
-          <a:lnRef idx="2">
-            <a:schemeClr val="accent1">
-              <a:shade val="50000"/>
-            </a:schemeClr>
-          </a:lnRef>
-          <a:fillRef idx="1">
-            <a:schemeClr val="accent1"/>
-          </a:fillRef>
-          <a:effectRef idx="0">
-            <a:schemeClr val="accent1"/>
-          </a:effectRef>
-          <a:fontRef idx="minor">
-            <a:schemeClr val="lt1"/>
-          </a:fontRef>
-        </p:style>
-        <p:txBody>
-          <a:bodyPr rtlCol="0" anchor="ctr"/>
-          <a:lstStyle/>
-          <a:p>
-            <a:pPr algn="ctr"/>
-            <a:endParaRPr lang="en-SG" dirty="0"/>
-          </a:p>
-        </p:txBody>
-      </p:sp>
-      <p:sp>
-        <p:nvSpPr>
-          <p:cNvPr id="168" name="TextBox 167">
-            <a:extLst>
-              <a:ext uri="{FF2B5EF4-FFF2-40B4-BE49-F238E27FC236}">
-                <a16:creationId xmlns:a16="http://schemas.microsoft.com/office/drawing/2014/main" id="{60F25782-1D1D-48EB-9FEC-28A934E2DA0C}"/>
-              </a:ext>
-            </a:extLst>
-          </p:cNvPr>
-          <p:cNvSpPr txBox="1"/>
-          <p:nvPr/>
-        </p:nvSpPr>
-        <p:spPr>
-          <a:xfrm>
-            <a:off x="-1907602" y="3858090"/>
-            <a:ext cx="613637" cy="369332"/>
-          </a:xfrm>
-          <a:prstGeom prst="rect">
-            <a:avLst/>
-          </a:prstGeom>
-          <a:noFill/>
-        </p:spPr>
-        <p:txBody>
-          <a:bodyPr wrap="square" rtlCol="0">
-            <a:spAutoFit/>
-          </a:bodyPr>
-          <a:lstStyle/>
-          <a:p>
-            <a:r>
-              <a:rPr lang="en-SG" dirty="0">
-                <a:solidFill>
-                  <a:schemeClr val="bg1"/>
-                </a:solidFill>
-              </a:rPr>
-              <a:t>alt</a:t>
-            </a:r>
-          </a:p>
-        </p:txBody>
-      </p:sp>
-      <p:sp>
-        <p:nvSpPr>
-          <p:cNvPr id="169" name="TextBox 168">
-            <a:extLst>
-              <a:ext uri="{FF2B5EF4-FFF2-40B4-BE49-F238E27FC236}">
-                <a16:creationId xmlns:a16="http://schemas.microsoft.com/office/drawing/2014/main" id="{46FCE258-E56D-4C94-AA44-13AFBC722358}"/>
-              </a:ext>
-            </a:extLst>
-          </p:cNvPr>
-          <p:cNvSpPr txBox="1"/>
-          <p:nvPr/>
-        </p:nvSpPr>
-        <p:spPr>
-          <a:xfrm>
-            <a:off x="-2013872" y="4150477"/>
-            <a:ext cx="2551266" cy="276999"/>
-          </a:xfrm>
-          <a:prstGeom prst="rect">
-            <a:avLst/>
-          </a:prstGeom>
-          <a:noFill/>
-        </p:spPr>
-        <p:txBody>
-          <a:bodyPr wrap="square" rtlCol="0">
-            <a:spAutoFit/>
-          </a:bodyPr>
-          <a:lstStyle/>
-          <a:p>
-            <a:r>
-              <a:rPr lang="en-SG" sz="1200" dirty="0">
-                <a:solidFill>
-                  <a:schemeClr val="bg1"/>
-                </a:solidFill>
-              </a:rPr>
-              <a:t>(!isScriptFolderPresent)</a:t>
-            </a:r>
-          </a:p>
-        </p:txBody>
-      </p:sp>
-      <p:cxnSp>
-        <p:nvCxnSpPr>
-          <p:cNvPr id="118" name="Straight Arrow Connector 117">
-            <a:extLst>
-              <a:ext uri="{FF2B5EF4-FFF2-40B4-BE49-F238E27FC236}">
-                <a16:creationId xmlns:a16="http://schemas.microsoft.com/office/drawing/2014/main" id="{1642D1E8-8964-42B9-9EB1-EF4FDA2D0F9B}"/>
-              </a:ext>
-            </a:extLst>
-          </p:cNvPr>
-          <p:cNvCxnSpPr>
-            <a:cxnSpLocks/>
-          </p:cNvCxnSpPr>
-          <p:nvPr/>
-        </p:nvCxnSpPr>
-        <p:spPr>
-          <a:xfrm>
-            <a:off x="-1543358" y="5410200"/>
-            <a:ext cx="1084608" cy="0"/>
-          </a:xfrm>
-          <a:prstGeom prst="straightConnector1">
-            <a:avLst/>
-          </a:prstGeom>
-          <a:ln w="19050">
-            <a:solidFill>
-              <a:srgbClr val="0070C0"/>
-            </a:solidFill>
-            <a:prstDash val="sysDash"/>
-            <a:headEnd type="arrow" w="med" len="med"/>
-            <a:tailEnd type="none" w="med" len="med"/>
-          </a:ln>
-        </p:spPr>
-        <p:style>
-          <a:lnRef idx="1">
-            <a:schemeClr val="accent1"/>
-          </a:lnRef>
-          <a:fillRef idx="0">
-            <a:schemeClr val="accent1"/>
-          </a:fillRef>
-          <a:effectRef idx="0">
-            <a:schemeClr val="accent1"/>
-          </a:effectRef>
-          <a:fontRef idx="minor">
-            <a:schemeClr val="tx1"/>
-          </a:fontRef>
-        </p:style>
-      </p:cxnSp>
-      <p:cxnSp>
-        <p:nvCxnSpPr>
-          <p:cNvPr id="73" name="Straight Arrow Connector 72">
-            <a:extLst>
-              <a:ext uri="{FF2B5EF4-FFF2-40B4-BE49-F238E27FC236}">
-                <a16:creationId xmlns:a16="http://schemas.microsoft.com/office/drawing/2014/main" id="{3805ADF4-5B22-44CD-A68F-99A2FEDC65CE}"/>
-              </a:ext>
-            </a:extLst>
-          </p:cNvPr>
-          <p:cNvCxnSpPr>
-            <a:cxnSpLocks/>
-          </p:cNvCxnSpPr>
-          <p:nvPr/>
-        </p:nvCxnSpPr>
-        <p:spPr>
-          <a:xfrm>
-            <a:off x="-329257" y="2599406"/>
-            <a:ext cx="1930458" cy="0"/>
-          </a:xfrm>
-          <a:prstGeom prst="straightConnector1">
-            <a:avLst/>
-          </a:prstGeom>
-          <a:ln w="19050">
-            <a:solidFill>
-              <a:schemeClr val="accent2"/>
-            </a:solidFill>
-            <a:prstDash val="sysDash"/>
-            <a:headEnd type="arrow" w="med" len="med"/>
-            <a:tailEnd type="none" w="med" len="med"/>
-          </a:ln>
-        </p:spPr>
-        <p:style>
-          <a:lnRef idx="1">
-            <a:schemeClr val="accent1"/>
-          </a:lnRef>
-          <a:fillRef idx="0">
-            <a:schemeClr val="accent1"/>
-          </a:fillRef>
-          <a:effectRef idx="0">
-            <a:schemeClr val="accent1"/>
-          </a:effectRef>
-          <a:fontRef idx="minor">
-            <a:schemeClr val="tx1"/>
-          </a:fontRef>
-        </p:style>
-      </p:cxnSp>
-      <p:sp>
-        <p:nvSpPr>
-          <p:cNvPr id="74" name="TextBox 73">
-            <a:extLst>
-              <a:ext uri="{FF2B5EF4-FFF2-40B4-BE49-F238E27FC236}">
-                <a16:creationId xmlns:a16="http://schemas.microsoft.com/office/drawing/2014/main" id="{87DA5068-23DF-4659-9696-694801379F6D}"/>
-              </a:ext>
-            </a:extLst>
-          </p:cNvPr>
-          <p:cNvSpPr txBox="1"/>
-          <p:nvPr/>
-        </p:nvSpPr>
-        <p:spPr>
-          <a:xfrm>
-            <a:off x="201006" y="2339372"/>
-            <a:ext cx="821938" cy="215444"/>
-          </a:xfrm>
-          <a:prstGeom prst="rect">
-            <a:avLst/>
-          </a:prstGeom>
-          <a:noFill/>
-        </p:spPr>
-        <p:txBody>
-          <a:bodyPr wrap="square" lIns="0" tIns="0" rIns="0" bIns="0" rtlCol="0">
-            <a:spAutoFit/>
-          </a:bodyPr>
-          <a:lstStyle>
-            <a:defPPr>
-              <a:defRPr lang="en-US"/>
-            </a:defPPr>
-            <a:lvl1pPr algn="r">
-              <a:defRPr sz="1400">
-                <a:solidFill>
-                  <a:srgbClr val="0070C0"/>
-                </a:solidFill>
-              </a:defRPr>
-            </a:lvl1pPr>
-          </a:lstStyle>
-          <a:p>
-            <a:r>
-              <a:rPr lang="en-US" dirty="0">
-                <a:solidFill>
-                  <a:srgbClr val="FF0000"/>
-                </a:solidFill>
-              </a:rPr>
-              <a:t>scriptPath</a:t>
-            </a:r>
-          </a:p>
-        </p:txBody>
-      </p:sp>
-      <p:cxnSp>
-        <p:nvCxnSpPr>
-          <p:cNvPr id="75" name="Straight Arrow Connector 74">
-            <a:extLst>
-              <a:ext uri="{FF2B5EF4-FFF2-40B4-BE49-F238E27FC236}">
-                <a16:creationId xmlns:a16="http://schemas.microsoft.com/office/drawing/2014/main" id="{FE6E83CD-CC8E-4106-8A7A-EA3E9FF271E3}"/>
-              </a:ext>
-            </a:extLst>
-          </p:cNvPr>
-          <p:cNvCxnSpPr>
-            <a:cxnSpLocks/>
-          </p:cNvCxnSpPr>
-          <p:nvPr/>
-        </p:nvCxnSpPr>
-        <p:spPr>
-          <a:xfrm>
-            <a:off x="-318833" y="2815267"/>
-            <a:ext cx="1910143" cy="8530"/>
-          </a:xfrm>
-          <a:prstGeom prst="straightConnector1">
-            <a:avLst/>
-          </a:prstGeom>
-          <a:ln w="19050">
-            <a:solidFill>
-              <a:schemeClr val="accent2"/>
-            </a:solidFill>
-            <a:tailEnd type="arrow"/>
-          </a:ln>
-        </p:spPr>
-        <p:style>
-          <a:lnRef idx="1">
-            <a:schemeClr val="accent1"/>
-          </a:lnRef>
-          <a:fillRef idx="0">
-            <a:schemeClr val="accent1"/>
-          </a:fillRef>
-          <a:effectRef idx="0">
-            <a:schemeClr val="accent1"/>
-          </a:effectRef>
-          <a:fontRef idx="minor">
-            <a:schemeClr val="tx1"/>
-          </a:fontRef>
-        </p:style>
-      </p:cxnSp>
-      <p:sp>
-        <p:nvSpPr>
-          <p:cNvPr id="76" name="TextBox 75">
-            <a:extLst>
-              <a:ext uri="{FF2B5EF4-FFF2-40B4-BE49-F238E27FC236}">
-                <a16:creationId xmlns:a16="http://schemas.microsoft.com/office/drawing/2014/main" id="{0F5DF299-8104-40F1-9F35-F0F05B5D327C}"/>
-              </a:ext>
-            </a:extLst>
-          </p:cNvPr>
-          <p:cNvSpPr txBox="1"/>
-          <p:nvPr/>
-        </p:nvSpPr>
-        <p:spPr>
-          <a:xfrm>
-            <a:off x="-39305" y="2838370"/>
-            <a:ext cx="1243673" cy="646331"/>
-          </a:xfrm>
-          <a:prstGeom prst="rect">
-            <a:avLst/>
-          </a:prstGeom>
-          <a:noFill/>
-        </p:spPr>
-        <p:txBody>
-          <a:bodyPr wrap="square" lIns="0" tIns="0" rIns="0" bIns="0" rtlCol="0">
-            <a:spAutoFit/>
-          </a:bodyPr>
-          <a:lstStyle>
-            <a:defPPr>
-              <a:defRPr lang="en-US"/>
-            </a:defPPr>
-            <a:lvl1pPr algn="r">
-              <a:defRPr sz="1400">
-                <a:solidFill>
-                  <a:srgbClr val="0070C0"/>
-                </a:solidFill>
-              </a:defRPr>
-            </a:lvl1pPr>
-          </a:lstStyle>
-          <a:p>
-            <a:pPr algn="ctr"/>
-            <a:r>
-              <a:rPr lang="en-US" dirty="0" err="1">
-                <a:solidFill>
-                  <a:srgbClr val="FF0000"/>
-                </a:solidFill>
-              </a:rPr>
-              <a:t>createFolder</a:t>
-            </a:r>
-            <a:endParaRPr lang="en-US" dirty="0">
-              <a:solidFill>
-                <a:srgbClr val="FF0000"/>
-              </a:solidFill>
-            </a:endParaRPr>
-          </a:p>
-          <a:p>
-            <a:pPr algn="ctr"/>
-            <a:r>
-              <a:rPr lang="en-US" dirty="0">
-                <a:solidFill>
-                  <a:srgbClr val="FF0000"/>
-                </a:solidFill>
-              </a:rPr>
-              <a:t>(ProjectLocation + “/Scripts/”)</a:t>
-            </a:r>
-          </a:p>
-        </p:txBody>
-      </p:sp>
-      <p:sp>
-        <p:nvSpPr>
-          <p:cNvPr id="91" name="TextBox 90">
-            <a:extLst>
-              <a:ext uri="{FF2B5EF4-FFF2-40B4-BE49-F238E27FC236}">
-                <a16:creationId xmlns:a16="http://schemas.microsoft.com/office/drawing/2014/main" id="{13B4BFCC-89C5-4C37-A979-3C33070CEC8C}"/>
-              </a:ext>
-            </a:extLst>
-          </p:cNvPr>
-          <p:cNvSpPr txBox="1"/>
-          <p:nvPr/>
-        </p:nvSpPr>
-        <p:spPr>
-          <a:xfrm>
-            <a:off x="-210033" y="4227259"/>
-            <a:ext cx="1386149" cy="646331"/>
-          </a:xfrm>
-          <a:prstGeom prst="rect">
-            <a:avLst/>
-          </a:prstGeom>
-          <a:noFill/>
-        </p:spPr>
-        <p:txBody>
-          <a:bodyPr wrap="square" lIns="0" tIns="0" rIns="0" bIns="0" rtlCol="0">
-            <a:spAutoFit/>
-          </a:bodyPr>
-          <a:lstStyle/>
-          <a:p>
-            <a:pPr algn="ctr"/>
-            <a:r>
-              <a:rPr lang="en-US" sz="1400" dirty="0">
-                <a:solidFill>
-                  <a:srgbClr val="0070C0"/>
-                </a:solidFill>
-              </a:rPr>
-              <a:t>addSampleTextFile(“/scripts”, defaultLocation)</a:t>
-            </a:r>
-          </a:p>
-        </p:txBody>
-      </p:sp>
-      <p:cxnSp>
-        <p:nvCxnSpPr>
-          <p:cNvPr id="119" name="Connector: Curved 118">
-            <a:extLst>
-              <a:ext uri="{FF2B5EF4-FFF2-40B4-BE49-F238E27FC236}">
-                <a16:creationId xmlns:a16="http://schemas.microsoft.com/office/drawing/2014/main" id="{08E9ED8E-7B65-4D5A-A160-422D68A4C618}"/>
-              </a:ext>
-            </a:extLst>
-          </p:cNvPr>
-          <p:cNvCxnSpPr>
-            <a:cxnSpLocks/>
-          </p:cNvCxnSpPr>
-          <p:nvPr/>
-        </p:nvCxnSpPr>
-        <p:spPr>
-          <a:xfrm>
-            <a:off x="-367867" y="4140875"/>
-            <a:ext cx="77219" cy="61094"/>
-          </a:xfrm>
-          <a:prstGeom prst="curvedConnector3">
-            <a:avLst>
-              <a:gd name="adj1" fmla="val 835537"/>
-            </a:avLst>
-          </a:prstGeom>
-          <a:ln w="19050">
-            <a:solidFill>
-              <a:schemeClr val="accent1"/>
-            </a:solidFill>
-            <a:tailEnd type="triangle"/>
-          </a:ln>
-        </p:spPr>
-        <p:style>
-          <a:lnRef idx="1">
-            <a:schemeClr val="accent1"/>
-          </a:lnRef>
-          <a:fillRef idx="0">
-            <a:schemeClr val="accent1"/>
-          </a:fillRef>
-          <a:effectRef idx="0">
-            <a:schemeClr val="accent1"/>
-          </a:effectRef>
-          <a:fontRef idx="minor">
-            <a:schemeClr val="tx1"/>
-          </a:fontRef>
-        </p:style>
-      </p:cxnSp>
-      <p:sp>
-        <p:nvSpPr>
-          <p:cNvPr id="121" name="Rectangle 65">
-            <a:extLst>
-              <a:ext uri="{FF2B5EF4-FFF2-40B4-BE49-F238E27FC236}">
-                <a16:creationId xmlns:a16="http://schemas.microsoft.com/office/drawing/2014/main" id="{6D277770-6951-4B1F-A7E2-AF04F5D8CDB9}"/>
-              </a:ext>
-            </a:extLst>
-          </p:cNvPr>
-          <p:cNvSpPr/>
-          <p:nvPr/>
-        </p:nvSpPr>
-        <p:spPr>
-          <a:xfrm>
-            <a:off x="2738879" y="0"/>
-            <a:ext cx="7014721" cy="6858000"/>
-          </a:xfrm>
-          <a:prstGeom prst="roundRect">
-            <a:avLst>
-              <a:gd name="adj" fmla="val 0"/>
-            </a:avLst>
-          </a:prstGeom>
-          <a:solidFill>
-            <a:schemeClr val="accent1">
-              <a:lumMod val="20000"/>
-              <a:lumOff val="80000"/>
-            </a:schemeClr>
-          </a:solidFill>
-          <a:ln w="19050">
-            <a:solidFill>
-              <a:schemeClr val="accent1"/>
-            </a:solidFill>
-          </a:ln>
-          <a:effectLst/>
-        </p:spPr>
-        <p:style>
-          <a:lnRef idx="1">
-            <a:schemeClr val="accent2"/>
-          </a:lnRef>
-          <a:fillRef idx="2">
-            <a:schemeClr val="accent2"/>
-          </a:fillRef>
-          <a:effectRef idx="1">
-            <a:schemeClr val="accent2"/>
-          </a:effectRef>
-          <a:fontRef idx="minor">
-            <a:schemeClr val="dk1"/>
-          </a:fontRef>
-        </p:style>
-        <p:txBody>
-          <a:bodyPr rtlCol="0" anchor="t"/>
-          <a:lstStyle/>
-          <a:p>
-            <a:endParaRPr lang="en-US" sz="1200" b="1" dirty="0">
-              <a:solidFill>
-                <a:srgbClr val="0070C0"/>
-              </a:solidFill>
-            </a:endParaRPr>
-          </a:p>
-          <a:p>
-            <a:endParaRPr lang="en-US" sz="1200" b="1" dirty="0">
-              <a:solidFill>
-                <a:srgbClr val="0070C0"/>
-              </a:solidFill>
-            </a:endParaRPr>
-          </a:p>
-          <a:p>
-            <a:endParaRPr lang="en-US" sz="1200" b="1" dirty="0">
-              <a:solidFill>
-                <a:srgbClr val="0070C0"/>
-              </a:solidFill>
-            </a:endParaRPr>
-          </a:p>
-          <a:p>
-            <a:endParaRPr lang="en-US" sz="1200" b="1" dirty="0">
-              <a:solidFill>
-                <a:srgbClr val="0070C0"/>
-              </a:solidFill>
-            </a:endParaRPr>
-          </a:p>
-          <a:p>
-            <a:endParaRPr lang="en-US" sz="1200" b="1" dirty="0">
-              <a:solidFill>
-                <a:srgbClr val="0070C0"/>
-              </a:solidFill>
-            </a:endParaRPr>
-          </a:p>
-          <a:p>
-            <a:endParaRPr lang="en-US" sz="1200" b="1" dirty="0">
-              <a:solidFill>
-                <a:srgbClr val="0070C0"/>
-              </a:solidFill>
-            </a:endParaRPr>
-          </a:p>
-        </p:txBody>
-      </p:sp>
-      <p:sp>
-        <p:nvSpPr>
-          <p:cNvPr id="122" name="Rectangle 62">
-            <a:extLst>
-              <a:ext uri="{FF2B5EF4-FFF2-40B4-BE49-F238E27FC236}">
-                <a16:creationId xmlns:a16="http://schemas.microsoft.com/office/drawing/2014/main" id="{4403717D-7216-426C-B5F9-9C0C8D62945B}"/>
-              </a:ext>
-            </a:extLst>
-          </p:cNvPr>
-          <p:cNvSpPr/>
-          <p:nvPr/>
-        </p:nvSpPr>
-        <p:spPr>
-          <a:xfrm>
-            <a:off x="3948442" y="842974"/>
-            <a:ext cx="1455629" cy="346760"/>
-          </a:xfrm>
-          <a:prstGeom prst="rect">
-            <a:avLst/>
-          </a:prstGeom>
-          <a:solidFill>
-            <a:srgbClr val="0070C0"/>
-          </a:solidFill>
-          <a:ln w="19050">
-            <a:solidFill>
-              <a:srgbClr val="0070C0"/>
-            </a:solidFill>
-          </a:ln>
-          <a:effectLst/>
-        </p:spPr>
-        <p:style>
-          <a:lnRef idx="1">
-            <a:schemeClr val="accent2"/>
-          </a:lnRef>
-          <a:fillRef idx="2">
-            <a:schemeClr val="accent2"/>
-          </a:fillRef>
-          <a:effectRef idx="1">
-            <a:schemeClr val="accent2"/>
-          </a:effectRef>
-          <a:fontRef idx="minor">
-            <a:schemeClr val="dk1"/>
-          </a:fontRef>
-        </p:style>
-        <p:txBody>
-          <a:bodyPr rtlCol="0" anchor="ctr"/>
-          <a:lstStyle/>
-          <a:p>
-            <a:pPr algn="ctr"/>
-            <a:r>
-              <a:rPr lang="en-US" sz="1600" dirty="0">
-                <a:solidFill>
-                  <a:schemeClr val="bg1"/>
-                </a:solidFill>
-              </a:rPr>
-              <a:t>:ScriptSetup</a:t>
-            </a:r>
-            <a:endParaRPr lang="en-SG" sz="1600" dirty="0">
-              <a:solidFill>
-                <a:schemeClr val="bg1"/>
-              </a:solidFill>
-            </a:endParaRPr>
-          </a:p>
-        </p:txBody>
-      </p:sp>
-      <p:cxnSp>
-        <p:nvCxnSpPr>
-          <p:cNvPr id="124" name="Straight Connector 123">
-            <a:extLst>
-              <a:ext uri="{FF2B5EF4-FFF2-40B4-BE49-F238E27FC236}">
-                <a16:creationId xmlns:a16="http://schemas.microsoft.com/office/drawing/2014/main" id="{962A441C-E310-4768-BDE8-711B51E4A66E}"/>
-              </a:ext>
-            </a:extLst>
-          </p:cNvPr>
-          <p:cNvCxnSpPr>
-            <a:cxnSpLocks/>
-            <a:stCxn id="122" idx="2"/>
-          </p:cNvCxnSpPr>
-          <p:nvPr/>
-        </p:nvCxnSpPr>
-        <p:spPr>
-          <a:xfrm>
-            <a:off x="4676257" y="1189734"/>
-            <a:ext cx="0" cy="3683856"/>
-          </a:xfrm>
-          <a:prstGeom prst="line">
-            <a:avLst/>
-          </a:prstGeom>
-          <a:ln w="19050">
-            <a:solidFill>
-              <a:srgbClr val="0070C0"/>
-            </a:solidFill>
-            <a:prstDash val="sysDash"/>
-          </a:ln>
-          <a:effectLst/>
-        </p:spPr>
-        <p:style>
-          <a:lnRef idx="1">
-            <a:schemeClr val="accent1"/>
-          </a:lnRef>
-          <a:fillRef idx="2">
-            <a:schemeClr val="accent1"/>
-          </a:fillRef>
-          <a:effectRef idx="1">
-            <a:schemeClr val="accent1"/>
-          </a:effectRef>
-          <a:fontRef idx="minor">
-            <a:schemeClr val="dk1"/>
-          </a:fontRef>
-        </p:style>
-      </p:cxnSp>
-      <p:sp>
-        <p:nvSpPr>
-          <p:cNvPr id="126" name="Rectangle 125">
-            <a:extLst>
-              <a:ext uri="{FF2B5EF4-FFF2-40B4-BE49-F238E27FC236}">
-                <a16:creationId xmlns:a16="http://schemas.microsoft.com/office/drawing/2014/main" id="{9390D805-5CE0-4EE9-ABFC-9A0EB03FFBF1}"/>
-              </a:ext>
-            </a:extLst>
-          </p:cNvPr>
-          <p:cNvSpPr/>
-          <p:nvPr/>
-        </p:nvSpPr>
-        <p:spPr>
-          <a:xfrm>
-            <a:off x="4611110" y="1404077"/>
-            <a:ext cx="134393" cy="3230804"/>
-          </a:xfrm>
-          <a:prstGeom prst="rect">
-            <a:avLst/>
-          </a:prstGeom>
-          <a:solidFill>
-            <a:srgbClr val="0070C0"/>
-          </a:solidFill>
-          <a:ln>
-            <a:solidFill>
-              <a:srgbClr val="0070C0"/>
-            </a:solidFill>
-          </a:ln>
-          <a:effectLst/>
-        </p:spPr>
-        <p:style>
-          <a:lnRef idx="1">
-            <a:schemeClr val="accent3"/>
-          </a:lnRef>
-          <a:fillRef idx="2">
-            <a:schemeClr val="accent3"/>
-          </a:fillRef>
-          <a:effectRef idx="1">
-            <a:schemeClr val="accent3"/>
-          </a:effectRef>
-          <a:fontRef idx="minor">
-            <a:schemeClr val="dk1"/>
-          </a:fontRef>
-        </p:style>
-        <p:txBody>
-          <a:bodyPr rtlCol="0" anchor="ctr"/>
-          <a:lstStyle/>
-          <a:p>
-            <a:pPr algn="ctr"/>
-            <a:endParaRPr lang="en-SG" sz="1400"/>
-          </a:p>
-        </p:txBody>
-      </p:sp>
-      <p:sp>
-        <p:nvSpPr>
-          <p:cNvPr id="127" name="Rectangle 62">
-            <a:extLst>
-              <a:ext uri="{FF2B5EF4-FFF2-40B4-BE49-F238E27FC236}">
-                <a16:creationId xmlns:a16="http://schemas.microsoft.com/office/drawing/2014/main" id="{7EEDDFE7-75A4-4B30-8C91-36583BDCBA02}"/>
-              </a:ext>
-            </a:extLst>
-          </p:cNvPr>
-          <p:cNvSpPr/>
-          <p:nvPr/>
-        </p:nvSpPr>
-        <p:spPr>
-          <a:xfrm>
-            <a:off x="8382000" y="826846"/>
-            <a:ext cx="1219200" cy="467684"/>
-          </a:xfrm>
-          <a:prstGeom prst="rect">
-            <a:avLst/>
-          </a:prstGeom>
-          <a:solidFill>
-            <a:schemeClr val="accent2"/>
-          </a:solidFill>
-          <a:ln w="19050">
-            <a:solidFill>
-              <a:schemeClr val="accent2"/>
-            </a:solidFill>
-          </a:ln>
-          <a:effectLst/>
-        </p:spPr>
-        <p:style>
-          <a:lnRef idx="1">
-            <a:schemeClr val="accent2"/>
-          </a:lnRef>
-          <a:fillRef idx="2">
-            <a:schemeClr val="accent2"/>
-          </a:fillRef>
-          <a:effectRef idx="1">
-            <a:schemeClr val="accent2"/>
-          </a:effectRef>
-          <a:fontRef idx="minor">
-            <a:schemeClr val="dk1"/>
-          </a:fontRef>
-        </p:style>
-        <p:txBody>
-          <a:bodyPr rtlCol="0" anchor="ctr"/>
-          <a:lstStyle/>
-          <a:p>
-            <a:pPr algn="ctr"/>
-            <a:r>
-              <a:rPr lang="en-US" sz="1600" dirty="0">
-                <a:solidFill>
-                  <a:schemeClr val="bg1"/>
-                </a:solidFill>
-              </a:rPr>
-              <a:t>:FileUtil</a:t>
-            </a:r>
-            <a:endParaRPr lang="en-SG" sz="1600" dirty="0">
-              <a:solidFill>
-                <a:schemeClr val="bg1"/>
-              </a:solidFill>
-            </a:endParaRPr>
-          </a:p>
-        </p:txBody>
-      </p:sp>
-      <p:cxnSp>
-        <p:nvCxnSpPr>
-          <p:cNvPr id="129" name="Straight Connector 128">
-            <a:extLst>
-              <a:ext uri="{FF2B5EF4-FFF2-40B4-BE49-F238E27FC236}">
-                <a16:creationId xmlns:a16="http://schemas.microsoft.com/office/drawing/2014/main" id="{0573B46B-8A3F-429D-969B-1603C373E282}"/>
-              </a:ext>
-            </a:extLst>
-          </p:cNvPr>
-          <p:cNvCxnSpPr>
-            <a:cxnSpLocks/>
-            <a:stCxn id="127" idx="2"/>
-          </p:cNvCxnSpPr>
-          <p:nvPr/>
-        </p:nvCxnSpPr>
-        <p:spPr>
-          <a:xfrm flipH="1">
-            <a:off x="8988137" y="1294530"/>
-            <a:ext cx="3463" cy="3429870"/>
-          </a:xfrm>
-          <a:prstGeom prst="line">
-            <a:avLst/>
-          </a:prstGeom>
-          <a:ln w="19050">
-            <a:solidFill>
-              <a:schemeClr val="accent2"/>
-            </a:solidFill>
-            <a:prstDash val="sysDash"/>
-          </a:ln>
-          <a:effectLst/>
-        </p:spPr>
-        <p:style>
-          <a:lnRef idx="1">
-            <a:schemeClr val="accent1"/>
-          </a:lnRef>
-          <a:fillRef idx="2">
-            <a:schemeClr val="accent1"/>
-          </a:fillRef>
-          <a:effectRef idx="1">
-            <a:schemeClr val="accent1"/>
-          </a:effectRef>
-          <a:fontRef idx="minor">
-            <a:schemeClr val="dk1"/>
-          </a:fontRef>
-        </p:style>
-      </p:cxnSp>
-      <p:sp>
-        <p:nvSpPr>
-          <p:cNvPr id="130" name="Rectangle 129">
-            <a:extLst>
-              <a:ext uri="{FF2B5EF4-FFF2-40B4-BE49-F238E27FC236}">
-                <a16:creationId xmlns:a16="http://schemas.microsoft.com/office/drawing/2014/main" id="{39497B21-8F79-4EE5-BFC9-46FFE1872A99}"/>
-              </a:ext>
-            </a:extLst>
-          </p:cNvPr>
-          <p:cNvSpPr/>
-          <p:nvPr/>
-        </p:nvSpPr>
-        <p:spPr>
-          <a:xfrm>
-            <a:off x="8927885" y="3352801"/>
-            <a:ext cx="120505" cy="1192248"/>
-          </a:xfrm>
-          <a:prstGeom prst="rect">
-            <a:avLst/>
-          </a:prstGeom>
-          <a:solidFill>
-            <a:schemeClr val="accent2"/>
-          </a:solidFill>
-          <a:ln>
-            <a:solidFill>
-              <a:schemeClr val="accent2"/>
-            </a:solidFill>
-          </a:ln>
-          <a:effectLst/>
-        </p:spPr>
-        <p:style>
-          <a:lnRef idx="1">
-            <a:schemeClr val="accent3"/>
-          </a:lnRef>
-          <a:fillRef idx="2">
-            <a:schemeClr val="accent3"/>
-          </a:fillRef>
-          <a:effectRef idx="1">
-            <a:schemeClr val="accent3"/>
-          </a:effectRef>
-          <a:fontRef idx="minor">
-            <a:schemeClr val="dk1"/>
-          </a:fontRef>
-        </p:style>
-        <p:txBody>
-          <a:bodyPr rtlCol="0" anchor="ctr"/>
-          <a:lstStyle/>
-          <a:p>
-            <a:pPr algn="ctr"/>
-            <a:endParaRPr lang="en-SG" sz="1400">
-              <a:solidFill>
-                <a:schemeClr val="dk1"/>
-              </a:solidFill>
-            </a:endParaRPr>
-          </a:p>
-        </p:txBody>
-      </p:sp>
-      <p:cxnSp>
-        <p:nvCxnSpPr>
-          <p:cNvPr id="131" name="Straight Arrow Connector 130">
-            <a:extLst>
-              <a:ext uri="{FF2B5EF4-FFF2-40B4-BE49-F238E27FC236}">
-                <a16:creationId xmlns:a16="http://schemas.microsoft.com/office/drawing/2014/main" id="{23E21B4A-02AD-42C1-9132-FEA309FCE6F8}"/>
-              </a:ext>
-            </a:extLst>
-          </p:cNvPr>
-          <p:cNvCxnSpPr/>
-          <p:nvPr/>
-        </p:nvCxnSpPr>
-        <p:spPr>
-          <a:xfrm>
-            <a:off x="3484434" y="1413919"/>
-            <a:ext cx="1119851" cy="0"/>
-          </a:xfrm>
-          <a:prstGeom prst="straightConnector1">
-            <a:avLst/>
-          </a:prstGeom>
-          <a:ln w="19050">
-            <a:solidFill>
-              <a:schemeClr val="accent1"/>
-            </a:solidFill>
-            <a:tailEnd type="arrow"/>
-          </a:ln>
-        </p:spPr>
-        <p:style>
-          <a:lnRef idx="1">
-            <a:schemeClr val="accent1"/>
-          </a:lnRef>
-          <a:fillRef idx="0">
-            <a:schemeClr val="accent1"/>
-          </a:fillRef>
-          <a:effectRef idx="0">
-            <a:schemeClr val="accent1"/>
-          </a:effectRef>
-          <a:fontRef idx="minor">
-            <a:schemeClr val="tx1"/>
-          </a:fontRef>
-        </p:style>
-      </p:cxnSp>
-      <p:sp>
-        <p:nvSpPr>
-          <p:cNvPr id="134" name="TextBox 133">
-            <a:extLst>
-              <a:ext uri="{FF2B5EF4-FFF2-40B4-BE49-F238E27FC236}">
-                <a16:creationId xmlns:a16="http://schemas.microsoft.com/office/drawing/2014/main" id="{B38D7C8F-ADD8-403C-A556-FEA9F2ABCF69}"/>
-              </a:ext>
-            </a:extLst>
-          </p:cNvPr>
-          <p:cNvSpPr txBox="1"/>
-          <p:nvPr/>
-        </p:nvSpPr>
-        <p:spPr>
-          <a:xfrm>
-            <a:off x="2927152" y="1439519"/>
-            <a:ext cx="1624103" cy="646331"/>
-          </a:xfrm>
-          <a:prstGeom prst="rect">
-            <a:avLst/>
-          </a:prstGeom>
-          <a:noFill/>
-        </p:spPr>
-        <p:txBody>
-          <a:bodyPr wrap="square" lIns="0" tIns="0" rIns="0" bIns="0" rtlCol="0">
-            <a:spAutoFit/>
-          </a:bodyPr>
-          <a:lstStyle/>
-          <a:p>
-            <a:pPr algn="ctr"/>
-            <a:r>
-              <a:rPr lang="en-US" sz="1400" dirty="0">
-                <a:solidFill>
-                  <a:srgbClr val="0070C0"/>
-                </a:solidFill>
-              </a:rPr>
-              <a:t>addSampleTextFile</a:t>
-            </a:r>
-          </a:p>
-          <a:p>
-            <a:pPr algn="ctr"/>
-            <a:r>
-              <a:rPr lang="en-US" sz="1400" dirty="0">
-                <a:solidFill>
-                  <a:srgbClr val="0070C0"/>
-                </a:solidFill>
-              </a:rPr>
-              <a:t>(“/scripts”, defaultLocation)</a:t>
-            </a:r>
-          </a:p>
-        </p:txBody>
-      </p:sp>
-      <p:sp>
-        <p:nvSpPr>
-          <p:cNvPr id="135" name="TextBox 134">
-            <a:extLst>
-              <a:ext uri="{FF2B5EF4-FFF2-40B4-BE49-F238E27FC236}">
-                <a16:creationId xmlns:a16="http://schemas.microsoft.com/office/drawing/2014/main" id="{D354A627-0E9E-412A-BD39-C1DA8D67A614}"/>
-              </a:ext>
-            </a:extLst>
-          </p:cNvPr>
-          <p:cNvSpPr txBox="1"/>
-          <p:nvPr/>
-        </p:nvSpPr>
-        <p:spPr>
-          <a:xfrm>
-            <a:off x="5079145" y="3424658"/>
-            <a:ext cx="3569861" cy="215444"/>
-          </a:xfrm>
-          <a:prstGeom prst="rect">
-            <a:avLst/>
-          </a:prstGeom>
-          <a:noFill/>
-        </p:spPr>
-        <p:txBody>
-          <a:bodyPr wrap="square" lIns="0" tIns="0" rIns="0" bIns="0" rtlCol="0">
-            <a:spAutoFit/>
-          </a:bodyPr>
-          <a:lstStyle>
-            <a:defPPr>
-              <a:defRPr lang="en-US"/>
-            </a:defPPr>
-            <a:lvl1pPr algn="r">
-              <a:defRPr sz="1400">
-                <a:solidFill>
-                  <a:srgbClr val="0070C0"/>
-                </a:solidFill>
-              </a:defRPr>
-            </a:lvl1pPr>
-          </a:lstStyle>
-          <a:p>
-            <a:pPr algn="ctr"/>
-            <a:r>
-              <a:rPr lang="en-US" dirty="0" err="1">
-                <a:solidFill>
-                  <a:srgbClr val="FF0000"/>
-                </a:solidFill>
-              </a:rPr>
-              <a:t>writeToTextFile</a:t>
-            </a:r>
-            <a:r>
-              <a:rPr lang="en-US" dirty="0">
-                <a:solidFill>
-                  <a:srgbClr val="FF0000"/>
-                </a:solidFill>
-              </a:rPr>
-              <a:t>(file, getAddPersonsText)</a:t>
+              <a:t>writeToTextFile(file, getAddPersonsText)</a:t>
             </a:r>
           </a:p>
         </p:txBody>
@@ -5325,7 +4319,7 @@
         </p:nvCxnSpPr>
         <p:spPr>
           <a:xfrm>
-            <a:off x="4766287" y="3407982"/>
+            <a:off x="3166087" y="3715992"/>
             <a:ext cx="4155544" cy="1"/>
           </a:xfrm>
           <a:prstGeom prst="straightConnector1">
@@ -5333,7 +4327,7 @@
           </a:prstGeom>
           <a:ln w="19050">
             <a:solidFill>
-              <a:schemeClr val="accent2"/>
+              <a:schemeClr val="accent6"/>
             </a:solidFill>
             <a:tailEnd type="arrow"/>
           </a:ln>
@@ -5369,7 +4363,7 @@
         </p:nvCxnSpPr>
         <p:spPr>
           <a:xfrm>
-            <a:off x="4766287" y="4495800"/>
+            <a:off x="3166087" y="4803810"/>
             <a:ext cx="4134760" cy="0"/>
           </a:xfrm>
           <a:prstGeom prst="straightConnector1">
@@ -5377,7 +4371,7 @@
           </a:prstGeom>
           <a:ln w="19050">
             <a:solidFill>
-              <a:schemeClr val="accent2"/>
+              <a:srgbClr val="31859C"/>
             </a:solidFill>
             <a:prstDash val="sysDash"/>
             <a:headEnd type="arrow" w="med" len="med"/>
@@ -5415,7 +4409,7 @@
         </p:nvCxnSpPr>
         <p:spPr>
           <a:xfrm>
-            <a:off x="3526502" y="4634881"/>
+            <a:off x="1926302" y="4942891"/>
             <a:ext cx="1084608" cy="0"/>
           </a:xfrm>
           <a:prstGeom prst="straightConnector1">
@@ -5423,7 +4417,7 @@
           </a:prstGeom>
           <a:ln w="19050">
             <a:solidFill>
-              <a:srgbClr val="0070C0"/>
+              <a:schemeClr val="accent6"/>
             </a:solidFill>
             <a:prstDash val="sysDash"/>
             <a:headEnd type="arrow" w="med" len="med"/>
@@ -5461,7 +4455,7 @@
         </p:nvCxnSpPr>
         <p:spPr>
           <a:xfrm>
-            <a:off x="4745503" y="3852042"/>
+            <a:off x="3145303" y="4160052"/>
             <a:ext cx="4155544" cy="0"/>
           </a:xfrm>
           <a:prstGeom prst="straightConnector1">
@@ -5469,7 +4463,7 @@
           </a:prstGeom>
           <a:ln w="19050">
             <a:solidFill>
-              <a:schemeClr val="accent2"/>
+              <a:srgbClr val="31859C"/>
             </a:solidFill>
             <a:prstDash val="sysDash"/>
             <a:headEnd type="arrow" w="med" len="med"/>
@@ -5507,7 +4501,7 @@
         </p:nvCxnSpPr>
         <p:spPr>
           <a:xfrm>
-            <a:off x="4784356" y="4072000"/>
+            <a:off x="3184156" y="4380010"/>
             <a:ext cx="4129391" cy="13476"/>
           </a:xfrm>
           <a:prstGeom prst="straightConnector1">
@@ -5515,7 +4509,7 @@
           </a:prstGeom>
           <a:ln w="19050">
             <a:solidFill>
-              <a:schemeClr val="accent2"/>
+              <a:schemeClr val="accent6"/>
             </a:solidFill>
             <a:tailEnd type="arrow"/>
           </a:ln>
@@ -5549,7 +4543,7 @@
         </p:nvSpPr>
         <p:spPr>
           <a:xfrm>
-            <a:off x="6123753" y="838200"/>
+            <a:off x="4523553" y="1146210"/>
             <a:ext cx="1219200" cy="467684"/>
           </a:xfrm>
           <a:prstGeom prst="rect">
@@ -5617,7 +4611,7 @@
         </p:nvCxnSpPr>
         <p:spPr>
           <a:xfrm>
-            <a:off x="6733353" y="1305884"/>
+            <a:off x="5133153" y="1613894"/>
             <a:ext cx="0" cy="1951828"/>
           </a:xfrm>
           <a:prstGeom prst="line">
@@ -5660,8 +4654,8 @@
         </p:nvSpPr>
         <p:spPr>
           <a:xfrm>
-            <a:off x="6669638" y="1594459"/>
-            <a:ext cx="120505" cy="1592622"/>
+            <a:off x="5081717" y="1955249"/>
+            <a:ext cx="120505" cy="498522"/>
           </a:xfrm>
           <a:prstGeom prst="rect">
             <a:avLst/>
@@ -5717,7 +4711,7 @@
         </p:nvSpPr>
         <p:spPr>
           <a:xfrm>
-            <a:off x="4909375" y="1674608"/>
+            <a:off x="3309175" y="1982618"/>
             <a:ext cx="1620823" cy="215444"/>
           </a:xfrm>
           <a:prstGeom prst="rect">
@@ -5770,7 +4764,7 @@
         </p:nvCxnSpPr>
         <p:spPr>
           <a:xfrm>
-            <a:off x="4751205" y="1647239"/>
+            <a:off x="3151005" y="1955249"/>
             <a:ext cx="1939184" cy="2665"/>
           </a:xfrm>
           <a:prstGeom prst="straightConnector1">
@@ -5778,7 +4772,7 @@
           </a:prstGeom>
           <a:ln w="19050">
             <a:solidFill>
-              <a:srgbClr val="00B050"/>
+              <a:schemeClr val="accent6"/>
             </a:solidFill>
             <a:tailEnd type="arrow"/>
           </a:ln>
@@ -5814,7 +4808,7 @@
         </p:nvCxnSpPr>
         <p:spPr>
           <a:xfrm>
-            <a:off x="4733126" y="2133600"/>
+            <a:off x="3132926" y="2441610"/>
             <a:ext cx="1930458" cy="0"/>
           </a:xfrm>
           <a:prstGeom prst="straightConnector1">
@@ -5860,7 +4854,7 @@
         </p:nvCxnSpPr>
         <p:spPr>
           <a:xfrm>
-            <a:off x="4751205" y="2243947"/>
+            <a:off x="3151005" y="2551957"/>
             <a:ext cx="1939184" cy="2665"/>
           </a:xfrm>
           <a:prstGeom prst="straightConnector1">
@@ -5868,7 +4862,7 @@
           </a:prstGeom>
           <a:ln w="19050">
             <a:solidFill>
-              <a:srgbClr val="00B050"/>
+              <a:schemeClr val="accent6"/>
             </a:solidFill>
             <a:tailEnd type="arrow"/>
           </a:ln>
@@ -5904,7 +4898,7 @@
         </p:nvCxnSpPr>
         <p:spPr>
           <a:xfrm>
-            <a:off x="4733126" y="2986177"/>
+            <a:off x="3132926" y="3294187"/>
             <a:ext cx="1930458" cy="0"/>
           </a:xfrm>
           <a:prstGeom prst="straightConnector1">
@@ -5950,7 +4944,7 @@
         </p:nvCxnSpPr>
         <p:spPr>
           <a:xfrm>
-            <a:off x="4758541" y="2743200"/>
+            <a:off x="3158341" y="3051210"/>
             <a:ext cx="1939184" cy="2665"/>
           </a:xfrm>
           <a:prstGeom prst="straightConnector1">
@@ -5992,7 +4986,7 @@
         </p:nvSpPr>
         <p:spPr>
           <a:xfrm>
-            <a:off x="4892918" y="2438400"/>
+            <a:off x="3292718" y="2746410"/>
             <a:ext cx="1620823" cy="215444"/>
           </a:xfrm>
           <a:prstGeom prst="rect">
@@ -6043,7 +5037,7 @@
         </p:nvSpPr>
         <p:spPr>
           <a:xfrm>
-            <a:off x="4876800" y="1905000"/>
+            <a:off x="3276600" y="2213010"/>
             <a:ext cx="1620823" cy="215444"/>
           </a:xfrm>
           <a:prstGeom prst="rect">
@@ -6094,7 +5088,7 @@
         </p:nvSpPr>
         <p:spPr>
           <a:xfrm>
-            <a:off x="4884943" y="2758207"/>
+            <a:off x="3284743" y="3066217"/>
             <a:ext cx="1620823" cy="215444"/>
           </a:xfrm>
           <a:prstGeom prst="rect">
@@ -6145,7 +5139,7 @@
         </p:nvSpPr>
         <p:spPr>
           <a:xfrm>
-            <a:off x="5064120" y="4130947"/>
+            <a:off x="3463920" y="4438957"/>
             <a:ext cx="3569861" cy="215444"/>
           </a:xfrm>
           <a:prstGeom prst="rect">
@@ -6172,37 +5166,70 @@
           <a:p>
             <a:pPr algn="ctr"/>
             <a:r>
-              <a:rPr lang="en-US" dirty="0" err="1">
+              <a:rPr lang="en-US" dirty="0">
                 <a:solidFill>
-                  <a:srgbClr val="FF0000"/>
+                  <a:srgbClr val="31859C"/>
                 </a:solidFill>
               </a:rPr>
-              <a:t>writeToTextFile</a:t>
-            </a:r>
-            <a:r>
-              <a:rPr lang="en-US" dirty="0">
-                <a:solidFill>
-                  <a:srgbClr val="FF0000"/>
-                </a:solidFill>
-              </a:rPr>
-              <a:t>(file2, </a:t>
-            </a:r>
-            <a:r>
-              <a:rPr lang="en-US" dirty="0" err="1">
-                <a:solidFill>
-                  <a:srgbClr val="FF0000"/>
-                </a:solidFill>
-              </a:rPr>
-              <a:t>getAddGroupsText</a:t>
-            </a:r>
-            <a:r>
-              <a:rPr lang="en-US" dirty="0">
-                <a:solidFill>
-                  <a:srgbClr val="FF0000"/>
-                </a:solidFill>
-              </a:rPr>
-              <a:t>)</a:t>
-            </a:r>
+              <a:t>writeToTextFile(file, getAddPersonsText)</a:t>
+            </a:r>
+          </a:p>
+        </p:txBody>
+      </p:sp>
+      <p:sp>
+        <p:nvSpPr>
+          <p:cNvPr id="55" name="Rectangle 54">
+            <a:extLst>
+              <a:ext uri="{FF2B5EF4-FFF2-40B4-BE49-F238E27FC236}">
+                <a16:creationId xmlns:a16="http://schemas.microsoft.com/office/drawing/2014/main" id="{D3D2C63D-7DF3-486B-9683-4278D4308987}"/>
+              </a:ext>
+            </a:extLst>
+          </p:cNvPr>
+          <p:cNvSpPr/>
+          <p:nvPr/>
+        </p:nvSpPr>
+        <p:spPr>
+          <a:xfrm>
+            <a:off x="5081716" y="3040737"/>
+            <a:ext cx="120505" cy="264931"/>
+          </a:xfrm>
+          <a:prstGeom prst="rect">
+            <a:avLst/>
+          </a:prstGeom>
+          <a:solidFill>
+            <a:srgbClr val="00B050"/>
+          </a:solidFill>
+          <a:ln>
+            <a:solidFill>
+              <a:srgbClr val="00B050"/>
+            </a:solidFill>
+          </a:ln>
+          <a:effectLst/>
+        </p:spPr>
+        <p:style>
+          <a:lnRef idx="1">
+            <a:schemeClr val="accent3"/>
+          </a:lnRef>
+          <a:fillRef idx="2">
+            <a:schemeClr val="accent3"/>
+          </a:fillRef>
+          <a:effectRef idx="1">
+            <a:schemeClr val="accent3"/>
+          </a:effectRef>
+          <a:fontRef idx="minor">
+            <a:schemeClr val="dk1"/>
+          </a:fontRef>
+        </p:style>
+        <p:txBody>
+          <a:bodyPr rtlCol="0" anchor="ctr"/>
+          <a:lstStyle/>
+          <a:p>
+            <a:pPr algn="ctr"/>
+            <a:endParaRPr lang="en-SG" sz="1400">
+              <a:solidFill>
+                <a:schemeClr val="dk1"/>
+              </a:solidFill>
+            </a:endParaRPr>
           </a:p>
         </p:txBody>
       </p:sp>

</xml_diff>